<commit_message>
Corrections Colm - 1
</commit_message>
<xml_diff>
--- a/paper/images/flowchart2.pptx
+++ b/paper/images/flowchart2.pptx
@@ -384,7 +384,7 @@
           <a:p>
             <a:fld id="{DF268C98-BE7A-47EC-BC75-D7811FD19112}" type="datetimeFigureOut">
               <a:rPr lang="en-GB" smtClean="0"/>
-              <a:t>15/04/2019</a:t>
+              <a:t>01/03/2020</a:t>
             </a:fld>
             <a:endParaRPr lang="en-GB"/>
           </a:p>
@@ -554,7 +554,7 @@
           <a:p>
             <a:fld id="{DF268C98-BE7A-47EC-BC75-D7811FD19112}" type="datetimeFigureOut">
               <a:rPr lang="en-GB" smtClean="0"/>
-              <a:t>15/04/2019</a:t>
+              <a:t>01/03/2020</a:t>
             </a:fld>
             <a:endParaRPr lang="en-GB"/>
           </a:p>
@@ -734,7 +734,7 @@
           <a:p>
             <a:fld id="{DF268C98-BE7A-47EC-BC75-D7811FD19112}" type="datetimeFigureOut">
               <a:rPr lang="en-GB" smtClean="0"/>
-              <a:t>15/04/2019</a:t>
+              <a:t>01/03/2020</a:t>
             </a:fld>
             <a:endParaRPr lang="en-GB"/>
           </a:p>
@@ -904,7 +904,7 @@
           <a:p>
             <a:fld id="{DF268C98-BE7A-47EC-BC75-D7811FD19112}" type="datetimeFigureOut">
               <a:rPr lang="en-GB" smtClean="0"/>
-              <a:t>15/04/2019</a:t>
+              <a:t>01/03/2020</a:t>
             </a:fld>
             <a:endParaRPr lang="en-GB"/>
           </a:p>
@@ -1150,7 +1150,7 @@
           <a:p>
             <a:fld id="{DF268C98-BE7A-47EC-BC75-D7811FD19112}" type="datetimeFigureOut">
               <a:rPr lang="en-GB" smtClean="0"/>
-              <a:t>15/04/2019</a:t>
+              <a:t>01/03/2020</a:t>
             </a:fld>
             <a:endParaRPr lang="en-GB"/>
           </a:p>
@@ -1382,7 +1382,7 @@
           <a:p>
             <a:fld id="{DF268C98-BE7A-47EC-BC75-D7811FD19112}" type="datetimeFigureOut">
               <a:rPr lang="en-GB" smtClean="0"/>
-              <a:t>15/04/2019</a:t>
+              <a:t>01/03/2020</a:t>
             </a:fld>
             <a:endParaRPr lang="en-GB"/>
           </a:p>
@@ -1749,7 +1749,7 @@
           <a:p>
             <a:fld id="{DF268C98-BE7A-47EC-BC75-D7811FD19112}" type="datetimeFigureOut">
               <a:rPr lang="en-GB" smtClean="0"/>
-              <a:t>15/04/2019</a:t>
+              <a:t>01/03/2020</a:t>
             </a:fld>
             <a:endParaRPr lang="en-GB"/>
           </a:p>
@@ -1867,7 +1867,7 @@
           <a:p>
             <a:fld id="{DF268C98-BE7A-47EC-BC75-D7811FD19112}" type="datetimeFigureOut">
               <a:rPr lang="en-GB" smtClean="0"/>
-              <a:t>15/04/2019</a:t>
+              <a:t>01/03/2020</a:t>
             </a:fld>
             <a:endParaRPr lang="en-GB"/>
           </a:p>
@@ -1962,7 +1962,7 @@
           <a:p>
             <a:fld id="{DF268C98-BE7A-47EC-BC75-D7811FD19112}" type="datetimeFigureOut">
               <a:rPr lang="en-GB" smtClean="0"/>
-              <a:t>15/04/2019</a:t>
+              <a:t>01/03/2020</a:t>
             </a:fld>
             <a:endParaRPr lang="en-GB"/>
           </a:p>
@@ -2239,7 +2239,7 @@
           <a:p>
             <a:fld id="{DF268C98-BE7A-47EC-BC75-D7811FD19112}" type="datetimeFigureOut">
               <a:rPr lang="en-GB" smtClean="0"/>
-              <a:t>15/04/2019</a:t>
+              <a:t>01/03/2020</a:t>
             </a:fld>
             <a:endParaRPr lang="en-GB"/>
           </a:p>
@@ -2496,7 +2496,7 @@
           <a:p>
             <a:fld id="{DF268C98-BE7A-47EC-BC75-D7811FD19112}" type="datetimeFigureOut">
               <a:rPr lang="en-GB" smtClean="0"/>
-              <a:t>15/04/2019</a:t>
+              <a:t>01/03/2020</a:t>
             </a:fld>
             <a:endParaRPr lang="en-GB"/>
           </a:p>
@@ -2709,7 +2709,7 @@
           <a:p>
             <a:fld id="{DF268C98-BE7A-47EC-BC75-D7811FD19112}" type="datetimeFigureOut">
               <a:rPr lang="en-GB" smtClean="0"/>
-              <a:t>15/04/2019</a:t>
+              <a:t>01/03/2020</a:t>
             </a:fld>
             <a:endParaRPr lang="en-GB"/>
           </a:p>
@@ -5009,7 +5009,7 @@
                 <a:latin typeface="Leelawadee UI Semilight" panose="020B0402040204020203" pitchFamily="34" charset="-34"/>
                 <a:cs typeface="Leelawadee UI Semilight" panose="020B0402040204020203" pitchFamily="34" charset="-34"/>
               </a:rPr>
-              <a:t>Warwick</a:t>
+              <a:t>WARP</a:t>
             </a:r>
             <a:r>
               <a:rPr lang="en-GB" sz="1473" b="1" dirty="0">

</xml_diff>